<commit_message>
Write 1, 2 paragraph of final project
</commit_message>
<xml_diff>
--- a/format-standardify/files/Doc/Презентация Microsoft PowerPoint.pptx
+++ b/format-standardify/files/Doc/Презентация Microsoft PowerPoint.pptx
@@ -5,10 +5,11 @@
     <p:sldMasterId id="2147483648" r:id="rId1"/>
   </p:sldMasterIdLst>
   <p:notesMasterIdLst>
-    <p:notesMasterId r:id="rId3"/>
+    <p:notesMasterId r:id="rId4"/>
   </p:notesMasterIdLst>
   <p:sldIdLst>
     <p:sldId id="256" r:id="rId2"/>
+    <p:sldId id="257" r:id="rId3"/>
   </p:sldIdLst>
   <p:sldSz cx="12192000" cy="6858000"/>
   <p:notesSz cx="6858000" cy="9144000"/>
@@ -107,6 +108,11 @@
       </a:defRPr>
     </a:lvl9pPr>
   </p:defaultTextStyle>
+  <p:extLst>
+    <p:ext uri="{EFAFB233-063F-42B5-8137-9DF3F51BA10A}">
+      <p15:sldGuideLst xmlns:p15="http://schemas.microsoft.com/office/powerpoint/2012/main"/>
+    </p:ext>
+  </p:extLst>
 </p:presentation>
 </file>
 
@@ -192,7 +198,7 @@
           <a:p>
             <a:fld id="{ECFFF1A6-4F1D-48BB-9D3C-EB0F9F0A05D8}" type="datetimeFigureOut">
               <a:rPr lang="ru-RU" smtClean="0"/>
-              <a:t>01.12.2019</a:t>
+              <a:t>02.12.2019</a:t>
             </a:fld>
             <a:endParaRPr lang="ru-RU"/>
           </a:p>
@@ -675,7 +681,7 @@
           <a:p>
             <a:fld id="{629E9740-DE1F-4910-894F-CD33FC2AB0C8}" type="datetimeFigureOut">
               <a:rPr lang="ru-RU" smtClean="0"/>
-              <a:t>01.12.2019</a:t>
+              <a:t>02.12.2019</a:t>
             </a:fld>
             <a:endParaRPr lang="ru-RU"/>
           </a:p>
@@ -845,7 +851,7 @@
           <a:p>
             <a:fld id="{629E9740-DE1F-4910-894F-CD33FC2AB0C8}" type="datetimeFigureOut">
               <a:rPr lang="ru-RU" smtClean="0"/>
-              <a:t>01.12.2019</a:t>
+              <a:t>02.12.2019</a:t>
             </a:fld>
             <a:endParaRPr lang="ru-RU"/>
           </a:p>
@@ -1025,7 +1031,7 @@
           <a:p>
             <a:fld id="{629E9740-DE1F-4910-894F-CD33FC2AB0C8}" type="datetimeFigureOut">
               <a:rPr lang="ru-RU" smtClean="0"/>
-              <a:t>01.12.2019</a:t>
+              <a:t>02.12.2019</a:t>
             </a:fld>
             <a:endParaRPr lang="ru-RU"/>
           </a:p>
@@ -1195,7 +1201,7 @@
           <a:p>
             <a:fld id="{629E9740-DE1F-4910-894F-CD33FC2AB0C8}" type="datetimeFigureOut">
               <a:rPr lang="ru-RU" smtClean="0"/>
-              <a:t>01.12.2019</a:t>
+              <a:t>02.12.2019</a:t>
             </a:fld>
             <a:endParaRPr lang="ru-RU"/>
           </a:p>
@@ -1441,7 +1447,7 @@
           <a:p>
             <a:fld id="{629E9740-DE1F-4910-894F-CD33FC2AB0C8}" type="datetimeFigureOut">
               <a:rPr lang="ru-RU" smtClean="0"/>
-              <a:t>01.12.2019</a:t>
+              <a:t>02.12.2019</a:t>
             </a:fld>
             <a:endParaRPr lang="ru-RU"/>
           </a:p>
@@ -1673,7 +1679,7 @@
           <a:p>
             <a:fld id="{629E9740-DE1F-4910-894F-CD33FC2AB0C8}" type="datetimeFigureOut">
               <a:rPr lang="ru-RU" smtClean="0"/>
-              <a:t>01.12.2019</a:t>
+              <a:t>02.12.2019</a:t>
             </a:fld>
             <a:endParaRPr lang="ru-RU"/>
           </a:p>
@@ -2040,7 +2046,7 @@
           <a:p>
             <a:fld id="{629E9740-DE1F-4910-894F-CD33FC2AB0C8}" type="datetimeFigureOut">
               <a:rPr lang="ru-RU" smtClean="0"/>
-              <a:t>01.12.2019</a:t>
+              <a:t>02.12.2019</a:t>
             </a:fld>
             <a:endParaRPr lang="ru-RU"/>
           </a:p>
@@ -2158,7 +2164,7 @@
           <a:p>
             <a:fld id="{629E9740-DE1F-4910-894F-CD33FC2AB0C8}" type="datetimeFigureOut">
               <a:rPr lang="ru-RU" smtClean="0"/>
-              <a:t>01.12.2019</a:t>
+              <a:t>02.12.2019</a:t>
             </a:fld>
             <a:endParaRPr lang="ru-RU"/>
           </a:p>
@@ -2253,7 +2259,7 @@
           <a:p>
             <a:fld id="{629E9740-DE1F-4910-894F-CD33FC2AB0C8}" type="datetimeFigureOut">
               <a:rPr lang="ru-RU" smtClean="0"/>
-              <a:t>01.12.2019</a:t>
+              <a:t>02.12.2019</a:t>
             </a:fld>
             <a:endParaRPr lang="ru-RU"/>
           </a:p>
@@ -2530,7 +2536,7 @@
           <a:p>
             <a:fld id="{629E9740-DE1F-4910-894F-CD33FC2AB0C8}" type="datetimeFigureOut">
               <a:rPr lang="ru-RU" smtClean="0"/>
-              <a:t>01.12.2019</a:t>
+              <a:t>02.12.2019</a:t>
             </a:fld>
             <a:endParaRPr lang="ru-RU"/>
           </a:p>
@@ -2783,7 +2789,7 @@
           <a:p>
             <a:fld id="{629E9740-DE1F-4910-894F-CD33FC2AB0C8}" type="datetimeFigureOut">
               <a:rPr lang="ru-RU" smtClean="0"/>
-              <a:t>01.12.2019</a:t>
+              <a:t>02.12.2019</a:t>
             </a:fld>
             <a:endParaRPr lang="ru-RU"/>
           </a:p>
@@ -2996,7 +3002,7 @@
           <a:p>
             <a:fld id="{629E9740-DE1F-4910-894F-CD33FC2AB0C8}" type="datetimeFigureOut">
               <a:rPr lang="ru-RU" smtClean="0"/>
-              <a:t>01.12.2019</a:t>
+              <a:t>02.12.2019</a:t>
             </a:fld>
             <a:endParaRPr lang="ru-RU"/>
           </a:p>
@@ -3610,6 +3616,628 @@
     <p:extLst>
       <p:ext uri="{BB962C8B-B14F-4D97-AF65-F5344CB8AC3E}">
         <p14:creationId xmlns:p14="http://schemas.microsoft.com/office/powerpoint/2010/main" val="136615191"/>
+      </p:ext>
+    </p:extLst>
+  </p:cSld>
+  <p:clrMapOvr>
+    <a:masterClrMapping/>
+  </p:clrMapOvr>
+</p:sld>
+</file>
+
+<file path=ppt/slides/slide2.xml><?xml version="1.0" encoding="utf-8"?>
+<p:sld xmlns:a="http://schemas.openxmlformats.org/drawingml/2006/main" xmlns:r="http://schemas.openxmlformats.org/officeDocument/2006/relationships" xmlns:p="http://schemas.openxmlformats.org/presentationml/2006/main">
+  <p:cSld>
+    <p:spTree>
+      <p:nvGrpSpPr>
+        <p:cNvPr id="1" name=""/>
+        <p:cNvGrpSpPr/>
+        <p:nvPr/>
+      </p:nvGrpSpPr>
+      <p:grpSpPr>
+        <a:xfrm>
+          <a:off x="0" y="0"/>
+          <a:ext cx="0" cy="0"/>
+          <a:chOff x="0" y="0"/>
+          <a:chExt cx="0" cy="0"/>
+        </a:xfrm>
+      </p:grpSpPr>
+      <p:pic>
+        <p:nvPicPr>
+          <p:cNvPr id="4" name="Рисунок 3"/>
+          <p:cNvPicPr/>
+          <p:nvPr/>
+        </p:nvPicPr>
+        <p:blipFill>
+          <a:blip r:embed="rId2"/>
+          <a:stretch>
+            <a:fillRect/>
+          </a:stretch>
+        </p:blipFill>
+        <p:spPr>
+          <a:xfrm>
+            <a:off x="387929" y="563618"/>
+            <a:ext cx="11050406" cy="5126181"/>
+          </a:xfrm>
+          <a:prstGeom prst="rect">
+            <a:avLst/>
+          </a:prstGeom>
+        </p:spPr>
+      </p:pic>
+      <p:sp>
+        <p:nvSpPr>
+          <p:cNvPr id="5" name="TextBox 4"/>
+          <p:cNvSpPr txBox="1"/>
+          <p:nvPr/>
+        </p:nvSpPr>
+        <p:spPr>
+          <a:xfrm>
+            <a:off x="6776220" y="3131544"/>
+            <a:ext cx="423872" cy="307777"/>
+          </a:xfrm>
+          <a:prstGeom prst="rect">
+            <a:avLst/>
+          </a:prstGeom>
+          <a:noFill/>
+        </p:spPr>
+        <p:txBody>
+          <a:bodyPr wrap="square" rtlCol="0">
+            <a:spAutoFit/>
+          </a:bodyPr>
+          <a:lstStyle/>
+          <a:p>
+            <a:r>
+              <a:rPr lang="uk-UA" sz="1400" b="1" dirty="0" smtClean="0"/>
+              <a:t>13</a:t>
+            </a:r>
+            <a:endParaRPr lang="ru-RU" sz="1400" b="1" dirty="0"/>
+          </a:p>
+        </p:txBody>
+      </p:sp>
+      <p:sp>
+        <p:nvSpPr>
+          <p:cNvPr id="6" name="TextBox 5"/>
+          <p:cNvSpPr txBox="1"/>
+          <p:nvPr/>
+        </p:nvSpPr>
+        <p:spPr>
+          <a:xfrm>
+            <a:off x="9133368" y="1595989"/>
+            <a:ext cx="233916" cy="307777"/>
+          </a:xfrm>
+          <a:prstGeom prst="rect">
+            <a:avLst/>
+          </a:prstGeom>
+          <a:noFill/>
+        </p:spPr>
+        <p:txBody>
+          <a:bodyPr wrap="square" rtlCol="0">
+            <a:spAutoFit/>
+          </a:bodyPr>
+          <a:lstStyle/>
+          <a:p>
+            <a:r>
+              <a:rPr lang="uk-UA" sz="1400" b="1" dirty="0" smtClean="0"/>
+              <a:t>2</a:t>
+            </a:r>
+            <a:endParaRPr lang="ru-RU" sz="1400" b="1" dirty="0"/>
+          </a:p>
+        </p:txBody>
+      </p:sp>
+      <p:sp>
+        <p:nvSpPr>
+          <p:cNvPr id="7" name="TextBox 6"/>
+          <p:cNvSpPr txBox="1"/>
+          <p:nvPr/>
+        </p:nvSpPr>
+        <p:spPr>
+          <a:xfrm>
+            <a:off x="8090452" y="2305935"/>
+            <a:ext cx="233916" cy="307777"/>
+          </a:xfrm>
+          <a:prstGeom prst="rect">
+            <a:avLst/>
+          </a:prstGeom>
+          <a:noFill/>
+        </p:spPr>
+        <p:txBody>
+          <a:bodyPr wrap="square" rtlCol="0">
+            <a:spAutoFit/>
+          </a:bodyPr>
+          <a:lstStyle/>
+          <a:p>
+            <a:r>
+              <a:rPr lang="uk-UA" sz="1400" b="1" dirty="0" smtClean="0"/>
+              <a:t>7</a:t>
+            </a:r>
+            <a:endParaRPr lang="ru-RU" sz="1400" b="1" dirty="0"/>
+          </a:p>
+        </p:txBody>
+      </p:sp>
+      <p:sp>
+        <p:nvSpPr>
+          <p:cNvPr id="8" name="TextBox 7"/>
+          <p:cNvSpPr txBox="1"/>
+          <p:nvPr/>
+        </p:nvSpPr>
+        <p:spPr>
+          <a:xfrm>
+            <a:off x="8920718" y="1749863"/>
+            <a:ext cx="233916" cy="307777"/>
+          </a:xfrm>
+          <a:prstGeom prst="rect">
+            <a:avLst/>
+          </a:prstGeom>
+          <a:noFill/>
+        </p:spPr>
+        <p:txBody>
+          <a:bodyPr wrap="square" rtlCol="0">
+            <a:spAutoFit/>
+          </a:bodyPr>
+          <a:lstStyle/>
+          <a:p>
+            <a:r>
+              <a:rPr lang="uk-UA" sz="1400" b="1" dirty="0" smtClean="0"/>
+              <a:t>3</a:t>
+            </a:r>
+            <a:endParaRPr lang="ru-RU" sz="1400" b="1" dirty="0"/>
+          </a:p>
+        </p:txBody>
+      </p:sp>
+      <p:sp>
+        <p:nvSpPr>
+          <p:cNvPr id="9" name="TextBox 8"/>
+          <p:cNvSpPr txBox="1"/>
+          <p:nvPr/>
+        </p:nvSpPr>
+        <p:spPr>
+          <a:xfrm>
+            <a:off x="9367284" y="1418043"/>
+            <a:ext cx="233916" cy="307777"/>
+          </a:xfrm>
+          <a:prstGeom prst="rect">
+            <a:avLst/>
+          </a:prstGeom>
+          <a:noFill/>
+        </p:spPr>
+        <p:txBody>
+          <a:bodyPr wrap="square" rtlCol="0">
+            <a:spAutoFit/>
+          </a:bodyPr>
+          <a:lstStyle/>
+          <a:p>
+            <a:r>
+              <a:rPr lang="uk-UA" sz="1400" b="1" dirty="0" smtClean="0"/>
+              <a:t>1</a:t>
+            </a:r>
+            <a:endParaRPr lang="ru-RU" sz="1400" b="1" dirty="0"/>
+          </a:p>
+        </p:txBody>
+      </p:sp>
+      <p:sp>
+        <p:nvSpPr>
+          <p:cNvPr id="10" name="TextBox 9"/>
+          <p:cNvSpPr txBox="1"/>
+          <p:nvPr/>
+        </p:nvSpPr>
+        <p:spPr>
+          <a:xfrm>
+            <a:off x="7017564" y="2995943"/>
+            <a:ext cx="542946" cy="307777"/>
+          </a:xfrm>
+          <a:prstGeom prst="rect">
+            <a:avLst/>
+          </a:prstGeom>
+          <a:noFill/>
+        </p:spPr>
+        <p:txBody>
+          <a:bodyPr wrap="square" rtlCol="0">
+            <a:spAutoFit/>
+          </a:bodyPr>
+          <a:lstStyle/>
+          <a:p>
+            <a:r>
+              <a:rPr lang="uk-UA" sz="1400" b="1" dirty="0" smtClean="0"/>
+              <a:t>12</a:t>
+            </a:r>
+            <a:endParaRPr lang="ru-RU" sz="1400" b="1" dirty="0"/>
+          </a:p>
+        </p:txBody>
+      </p:sp>
+      <p:sp>
+        <p:nvSpPr>
+          <p:cNvPr id="11" name="TextBox 10"/>
+          <p:cNvSpPr txBox="1"/>
+          <p:nvPr/>
+        </p:nvSpPr>
+        <p:spPr>
+          <a:xfrm>
+            <a:off x="7200092" y="2860342"/>
+            <a:ext cx="509275" cy="307777"/>
+          </a:xfrm>
+          <a:prstGeom prst="rect">
+            <a:avLst/>
+          </a:prstGeom>
+          <a:noFill/>
+        </p:spPr>
+        <p:txBody>
+          <a:bodyPr wrap="square" rtlCol="0">
+            <a:spAutoFit/>
+          </a:bodyPr>
+          <a:lstStyle/>
+          <a:p>
+            <a:r>
+              <a:rPr lang="uk-UA" sz="1400" b="1" dirty="0" smtClean="0"/>
+              <a:t>11</a:t>
+            </a:r>
+            <a:endParaRPr lang="ru-RU" sz="1400" b="1" dirty="0"/>
+          </a:p>
+        </p:txBody>
+      </p:sp>
+      <p:sp>
+        <p:nvSpPr>
+          <p:cNvPr id="12" name="TextBox 11"/>
+          <p:cNvSpPr txBox="1"/>
+          <p:nvPr/>
+        </p:nvSpPr>
+        <p:spPr>
+          <a:xfrm>
+            <a:off x="7392408" y="2724741"/>
+            <a:ext cx="441935" cy="307777"/>
+          </a:xfrm>
+          <a:prstGeom prst="rect">
+            <a:avLst/>
+          </a:prstGeom>
+          <a:noFill/>
+        </p:spPr>
+        <p:txBody>
+          <a:bodyPr wrap="square" rtlCol="0">
+            <a:spAutoFit/>
+          </a:bodyPr>
+          <a:lstStyle/>
+          <a:p>
+            <a:r>
+              <a:rPr lang="uk-UA" sz="1400" b="1" dirty="0" smtClean="0"/>
+              <a:t>10</a:t>
+            </a:r>
+            <a:endParaRPr lang="ru-RU" sz="1400" b="1" dirty="0"/>
+          </a:p>
+        </p:txBody>
+      </p:sp>
+      <p:sp>
+        <p:nvSpPr>
+          <p:cNvPr id="13" name="TextBox 12"/>
+          <p:cNvSpPr txBox="1"/>
+          <p:nvPr/>
+        </p:nvSpPr>
+        <p:spPr>
+          <a:xfrm>
+            <a:off x="7664220" y="2594712"/>
+            <a:ext cx="233916" cy="307777"/>
+          </a:xfrm>
+          <a:prstGeom prst="rect">
+            <a:avLst/>
+          </a:prstGeom>
+          <a:noFill/>
+        </p:spPr>
+        <p:txBody>
+          <a:bodyPr wrap="square" rtlCol="0">
+            <a:spAutoFit/>
+          </a:bodyPr>
+          <a:lstStyle/>
+          <a:p>
+            <a:r>
+              <a:rPr lang="uk-UA" sz="1400" b="1" dirty="0" smtClean="0"/>
+              <a:t>9</a:t>
+            </a:r>
+            <a:endParaRPr lang="ru-RU" sz="1400" b="1" dirty="0"/>
+          </a:p>
+        </p:txBody>
+      </p:sp>
+      <p:sp>
+        <p:nvSpPr>
+          <p:cNvPr id="14" name="TextBox 13"/>
+          <p:cNvSpPr txBox="1"/>
+          <p:nvPr/>
+        </p:nvSpPr>
+        <p:spPr>
+          <a:xfrm>
+            <a:off x="8718235" y="1879754"/>
+            <a:ext cx="233916" cy="307777"/>
+          </a:xfrm>
+          <a:prstGeom prst="rect">
+            <a:avLst/>
+          </a:prstGeom>
+          <a:noFill/>
+        </p:spPr>
+        <p:txBody>
+          <a:bodyPr wrap="square" rtlCol="0">
+            <a:spAutoFit/>
+          </a:bodyPr>
+          <a:lstStyle/>
+          <a:p>
+            <a:r>
+              <a:rPr lang="uk-UA" sz="1400" b="1" dirty="0" smtClean="0"/>
+              <a:t>4</a:t>
+            </a:r>
+            <a:endParaRPr lang="ru-RU" sz="1400" b="1" dirty="0"/>
+          </a:p>
+        </p:txBody>
+      </p:sp>
+      <p:sp>
+        <p:nvSpPr>
+          <p:cNvPr id="15" name="TextBox 14"/>
+          <p:cNvSpPr txBox="1"/>
+          <p:nvPr/>
+        </p:nvSpPr>
+        <p:spPr>
+          <a:xfrm>
+            <a:off x="8303102" y="2159149"/>
+            <a:ext cx="233916" cy="307777"/>
+          </a:xfrm>
+          <a:prstGeom prst="rect">
+            <a:avLst/>
+          </a:prstGeom>
+          <a:noFill/>
+        </p:spPr>
+        <p:txBody>
+          <a:bodyPr wrap="square" rtlCol="0">
+            <a:spAutoFit/>
+          </a:bodyPr>
+          <a:lstStyle/>
+          <a:p>
+            <a:r>
+              <a:rPr lang="uk-UA" sz="1400" b="1" dirty="0" smtClean="0"/>
+              <a:t>6</a:t>
+            </a:r>
+            <a:endParaRPr lang="ru-RU" sz="1400" b="1" dirty="0"/>
+          </a:p>
+        </p:txBody>
+      </p:sp>
+      <p:sp>
+        <p:nvSpPr>
+          <p:cNvPr id="16" name="TextBox 15"/>
+          <p:cNvSpPr txBox="1"/>
+          <p:nvPr/>
+        </p:nvSpPr>
+        <p:spPr>
+          <a:xfrm>
+            <a:off x="8505585" y="2020417"/>
+            <a:ext cx="233916" cy="307777"/>
+          </a:xfrm>
+          <a:prstGeom prst="rect">
+            <a:avLst/>
+          </a:prstGeom>
+          <a:noFill/>
+        </p:spPr>
+        <p:txBody>
+          <a:bodyPr wrap="square" rtlCol="0">
+            <a:spAutoFit/>
+          </a:bodyPr>
+          <a:lstStyle/>
+          <a:p>
+            <a:r>
+              <a:rPr lang="uk-UA" sz="1400" b="1" dirty="0" smtClean="0"/>
+              <a:t>5</a:t>
+            </a:r>
+            <a:endParaRPr lang="ru-RU" sz="1400" b="1" dirty="0"/>
+          </a:p>
+        </p:txBody>
+      </p:sp>
+      <p:sp>
+        <p:nvSpPr>
+          <p:cNvPr id="17" name="TextBox 16"/>
+          <p:cNvSpPr txBox="1"/>
+          <p:nvPr/>
+        </p:nvSpPr>
+        <p:spPr>
+          <a:xfrm>
+            <a:off x="7866703" y="2475316"/>
+            <a:ext cx="233916" cy="307777"/>
+          </a:xfrm>
+          <a:prstGeom prst="rect">
+            <a:avLst/>
+          </a:prstGeom>
+          <a:noFill/>
+        </p:spPr>
+        <p:txBody>
+          <a:bodyPr wrap="square" rtlCol="0">
+            <a:spAutoFit/>
+          </a:bodyPr>
+          <a:lstStyle/>
+          <a:p>
+            <a:r>
+              <a:rPr lang="uk-UA" sz="1400" b="1" dirty="0" smtClean="0"/>
+              <a:t>8</a:t>
+            </a:r>
+            <a:endParaRPr lang="ru-RU" sz="1400" b="1" dirty="0"/>
+          </a:p>
+        </p:txBody>
+      </p:sp>
+      <p:sp>
+        <p:nvSpPr>
+          <p:cNvPr id="18" name="TextBox 17"/>
+          <p:cNvSpPr txBox="1"/>
+          <p:nvPr/>
+        </p:nvSpPr>
+        <p:spPr>
+          <a:xfrm>
+            <a:off x="6159428" y="3589207"/>
+            <a:ext cx="538716" cy="307777"/>
+          </a:xfrm>
+          <a:prstGeom prst="rect">
+            <a:avLst/>
+          </a:prstGeom>
+          <a:noFill/>
+        </p:spPr>
+        <p:txBody>
+          <a:bodyPr wrap="square" rtlCol="0">
+            <a:spAutoFit/>
+          </a:bodyPr>
+          <a:lstStyle/>
+          <a:p>
+            <a:r>
+              <a:rPr lang="uk-UA" sz="1400" b="1" dirty="0" smtClean="0"/>
+              <a:t>16</a:t>
+            </a:r>
+            <a:endParaRPr lang="ru-RU" sz="1400" b="1" dirty="0"/>
+          </a:p>
+        </p:txBody>
+      </p:sp>
+      <p:sp>
+        <p:nvSpPr>
+          <p:cNvPr id="19" name="TextBox 18"/>
+          <p:cNvSpPr txBox="1"/>
+          <p:nvPr/>
+        </p:nvSpPr>
+        <p:spPr>
+          <a:xfrm>
+            <a:off x="6364988" y="3433076"/>
+            <a:ext cx="538716" cy="307777"/>
+          </a:xfrm>
+          <a:prstGeom prst="rect">
+            <a:avLst/>
+          </a:prstGeom>
+          <a:noFill/>
+        </p:spPr>
+        <p:txBody>
+          <a:bodyPr wrap="square" rtlCol="0">
+            <a:spAutoFit/>
+          </a:bodyPr>
+          <a:lstStyle/>
+          <a:p>
+            <a:r>
+              <a:rPr lang="uk-UA" sz="1400" b="1" dirty="0" smtClean="0"/>
+              <a:t>15</a:t>
+            </a:r>
+            <a:endParaRPr lang="ru-RU" sz="1400" b="1" dirty="0"/>
+          </a:p>
+        </p:txBody>
+      </p:sp>
+      <p:sp>
+        <p:nvSpPr>
+          <p:cNvPr id="21" name="TextBox 20"/>
+          <p:cNvSpPr txBox="1"/>
+          <p:nvPr/>
+        </p:nvSpPr>
+        <p:spPr>
+          <a:xfrm>
+            <a:off x="5670328" y="3913821"/>
+            <a:ext cx="733279" cy="307777"/>
+          </a:xfrm>
+          <a:prstGeom prst="rect">
+            <a:avLst/>
+          </a:prstGeom>
+          <a:noFill/>
+        </p:spPr>
+        <p:txBody>
+          <a:bodyPr wrap="square" rtlCol="0">
+            <a:spAutoFit/>
+          </a:bodyPr>
+          <a:lstStyle/>
+          <a:p>
+            <a:r>
+              <a:rPr lang="uk-UA" sz="1400" b="1" dirty="0" smtClean="0"/>
+              <a:t>18</a:t>
+            </a:r>
+            <a:endParaRPr lang="ru-RU" sz="1400" b="1" dirty="0"/>
+          </a:p>
+        </p:txBody>
+      </p:sp>
+      <p:sp>
+        <p:nvSpPr>
+          <p:cNvPr id="22" name="TextBox 21"/>
+          <p:cNvSpPr txBox="1"/>
+          <p:nvPr/>
+        </p:nvSpPr>
+        <p:spPr>
+          <a:xfrm>
+            <a:off x="6578891" y="3248410"/>
+            <a:ext cx="648660" cy="307777"/>
+          </a:xfrm>
+          <a:prstGeom prst="rect">
+            <a:avLst/>
+          </a:prstGeom>
+          <a:noFill/>
+        </p:spPr>
+        <p:txBody>
+          <a:bodyPr wrap="square" rtlCol="0">
+            <a:spAutoFit/>
+          </a:bodyPr>
+          <a:lstStyle/>
+          <a:p>
+            <a:r>
+              <a:rPr lang="uk-UA" sz="1400" b="1" dirty="0" smtClean="0"/>
+              <a:t>14</a:t>
+            </a:r>
+            <a:endParaRPr lang="ru-RU" sz="1400" b="1" dirty="0"/>
+          </a:p>
+        </p:txBody>
+      </p:sp>
+      <p:sp>
+        <p:nvSpPr>
+          <p:cNvPr id="24" name="TextBox 23"/>
+          <p:cNvSpPr txBox="1"/>
+          <p:nvPr/>
+        </p:nvSpPr>
+        <p:spPr>
+          <a:xfrm>
+            <a:off x="5434017" y="4066221"/>
+            <a:ext cx="506555" cy="307777"/>
+          </a:xfrm>
+          <a:prstGeom prst="rect">
+            <a:avLst/>
+          </a:prstGeom>
+          <a:noFill/>
+        </p:spPr>
+        <p:txBody>
+          <a:bodyPr wrap="square" rtlCol="0">
+            <a:spAutoFit/>
+          </a:bodyPr>
+          <a:lstStyle/>
+          <a:p>
+            <a:r>
+              <a:rPr lang="uk-UA" sz="1400" b="1" dirty="0" smtClean="0"/>
+              <a:t>19</a:t>
+            </a:r>
+            <a:endParaRPr lang="ru-RU" sz="1400" b="1" dirty="0"/>
+          </a:p>
+        </p:txBody>
+      </p:sp>
+      <p:sp>
+        <p:nvSpPr>
+          <p:cNvPr id="25" name="TextBox 24"/>
+          <p:cNvSpPr txBox="1"/>
+          <p:nvPr/>
+        </p:nvSpPr>
+        <p:spPr>
+          <a:xfrm>
+            <a:off x="5940572" y="3761421"/>
+            <a:ext cx="606420" cy="307777"/>
+          </a:xfrm>
+          <a:prstGeom prst="rect">
+            <a:avLst/>
+          </a:prstGeom>
+          <a:noFill/>
+        </p:spPr>
+        <p:txBody>
+          <a:bodyPr wrap="square" rtlCol="0">
+            <a:spAutoFit/>
+          </a:bodyPr>
+          <a:lstStyle/>
+          <a:p>
+            <a:r>
+              <a:rPr lang="uk-UA" sz="1400" b="1" dirty="0" smtClean="0"/>
+              <a:t>17</a:t>
+            </a:r>
+            <a:endParaRPr lang="ru-RU" sz="1400" b="1" dirty="0"/>
+          </a:p>
+        </p:txBody>
+      </p:sp>
+    </p:spTree>
+    <p:extLst>
+      <p:ext uri="{BB962C8B-B14F-4D97-AF65-F5344CB8AC3E}">
+        <p14:creationId xmlns:p14="http://schemas.microsoft.com/office/powerpoint/2010/main" val="3922873081"/>
       </p:ext>
     </p:extLst>
   </p:cSld>

</xml_diff>